<commit_message>
Azure Identity Management and Microsoft Graph - Add README
</commit_message>
<xml_diff>
--- a/MS-Graph-and-Identity-Management/Azure Identity Management and Microsoft Graph.pptx
+++ b/MS-Graph-and-Identity-Management/Azure Identity Management and Microsoft Graph.pptx
@@ -5,7 +5,7 @@
     <p:sldMasterId id="2147483648" r:id="rId1"/>
   </p:sldMasterIdLst>
   <p:notesMasterIdLst>
-    <p:notesMasterId r:id="rId18"/>
+    <p:notesMasterId r:id="rId19"/>
   </p:notesMasterIdLst>
   <p:sldIdLst>
     <p:sldId id="256" r:id="rId2"/>
@@ -23,7 +23,8 @@
     <p:sldId id="265" r:id="rId14"/>
     <p:sldId id="267" r:id="rId15"/>
     <p:sldId id="269" r:id="rId16"/>
-    <p:sldId id="270" r:id="rId17"/>
+    <p:sldId id="274" r:id="rId17"/>
+    <p:sldId id="270" r:id="rId18"/>
   </p:sldIdLst>
   <p:sldSz cx="12192000" cy="6858000"/>
   <p:notesSz cx="6858000" cy="9144000"/>
@@ -142,6 +143,7 @@
             <p14:sldId id="265"/>
             <p14:sldId id="267"/>
             <p14:sldId id="269"/>
+            <p14:sldId id="274"/>
             <p14:sldId id="270"/>
           </p14:sldIdLst>
         </p14:section>
@@ -236,7 +238,7 @@
           <a:p>
             <a:fld id="{555FAD6D-567C-4949-8AA5-3A96AEB1B6DC}" type="datetimeFigureOut">
               <a:rPr lang="en-US" smtClean="0"/>
-              <a:t>10/6/2022</a:t>
+              <a:t>10/23/2023</a:t>
             </a:fld>
             <a:endParaRPr lang="en-US"/>
           </a:p>
@@ -897,7 +899,7 @@
           <a:p>
             <a:fld id="{233F4723-5866-46D7-B75F-A621B95D2041}" type="slidenum">
               <a:rPr lang="en-US" smtClean="0"/>
-              <a:t>16</a:t>
+              <a:t>17</a:t>
             </a:fld>
             <a:endParaRPr lang="en-US"/>
           </a:p>
@@ -2245,7 +2247,7 @@
           <a:p>
             <a:fld id="{06707B04-0A34-4415-BFD4-4D7A84B0569C}" type="datetimeFigureOut">
               <a:rPr lang="en-US" smtClean="0"/>
-              <a:t>10/6/2022</a:t>
+              <a:t>10/23/2023</a:t>
             </a:fld>
             <a:endParaRPr lang="en-US"/>
           </a:p>
@@ -2443,7 +2445,7 @@
           <a:p>
             <a:fld id="{06707B04-0A34-4415-BFD4-4D7A84B0569C}" type="datetimeFigureOut">
               <a:rPr lang="en-US" smtClean="0"/>
-              <a:t>10/6/2022</a:t>
+              <a:t>10/23/2023</a:t>
             </a:fld>
             <a:endParaRPr lang="en-US"/>
           </a:p>
@@ -2651,7 +2653,7 @@
           <a:p>
             <a:fld id="{06707B04-0A34-4415-BFD4-4D7A84B0569C}" type="datetimeFigureOut">
               <a:rPr lang="en-US" smtClean="0"/>
-              <a:t>10/6/2022</a:t>
+              <a:t>10/23/2023</a:t>
             </a:fld>
             <a:endParaRPr lang="en-US"/>
           </a:p>
@@ -2849,7 +2851,7 @@
           <a:p>
             <a:fld id="{06707B04-0A34-4415-BFD4-4D7A84B0569C}" type="datetimeFigureOut">
               <a:rPr lang="en-US" smtClean="0"/>
-              <a:t>10/6/2022</a:t>
+              <a:t>10/23/2023</a:t>
             </a:fld>
             <a:endParaRPr lang="en-US"/>
           </a:p>
@@ -3124,7 +3126,7 @@
           <a:p>
             <a:fld id="{06707B04-0A34-4415-BFD4-4D7A84B0569C}" type="datetimeFigureOut">
               <a:rPr lang="en-US" smtClean="0"/>
-              <a:t>10/6/2022</a:t>
+              <a:t>10/23/2023</a:t>
             </a:fld>
             <a:endParaRPr lang="en-US"/>
           </a:p>
@@ -3389,7 +3391,7 @@
           <a:p>
             <a:fld id="{06707B04-0A34-4415-BFD4-4D7A84B0569C}" type="datetimeFigureOut">
               <a:rPr lang="en-US" smtClean="0"/>
-              <a:t>10/6/2022</a:t>
+              <a:t>10/23/2023</a:t>
             </a:fld>
             <a:endParaRPr lang="en-US"/>
           </a:p>
@@ -3801,7 +3803,7 @@
           <a:p>
             <a:fld id="{06707B04-0A34-4415-BFD4-4D7A84B0569C}" type="datetimeFigureOut">
               <a:rPr lang="en-US" smtClean="0"/>
-              <a:t>10/6/2022</a:t>
+              <a:t>10/23/2023</a:t>
             </a:fld>
             <a:endParaRPr lang="en-US"/>
           </a:p>
@@ -3942,7 +3944,7 @@
           <a:p>
             <a:fld id="{06707B04-0A34-4415-BFD4-4D7A84B0569C}" type="datetimeFigureOut">
               <a:rPr lang="en-US" smtClean="0"/>
-              <a:t>10/6/2022</a:t>
+              <a:t>10/23/2023</a:t>
             </a:fld>
             <a:endParaRPr lang="en-US"/>
           </a:p>
@@ -4055,7 +4057,7 @@
           <a:p>
             <a:fld id="{06707B04-0A34-4415-BFD4-4D7A84B0569C}" type="datetimeFigureOut">
               <a:rPr lang="en-US" smtClean="0"/>
-              <a:t>10/6/2022</a:t>
+              <a:t>10/23/2023</a:t>
             </a:fld>
             <a:endParaRPr lang="en-US"/>
           </a:p>
@@ -4366,7 +4368,7 @@
           <a:p>
             <a:fld id="{06707B04-0A34-4415-BFD4-4D7A84B0569C}" type="datetimeFigureOut">
               <a:rPr lang="en-US" smtClean="0"/>
-              <a:t>10/6/2022</a:t>
+              <a:t>10/23/2023</a:t>
             </a:fld>
             <a:endParaRPr lang="en-US"/>
           </a:p>
@@ -4654,7 +4656,7 @@
           <a:p>
             <a:fld id="{06707B04-0A34-4415-BFD4-4D7A84B0569C}" type="datetimeFigureOut">
               <a:rPr lang="en-US" smtClean="0"/>
-              <a:t>10/6/2022</a:t>
+              <a:t>10/23/2023</a:t>
             </a:fld>
             <a:endParaRPr lang="en-US"/>
           </a:p>
@@ -4895,7 +4897,7 @@
           <a:p>
             <a:fld id="{06707B04-0A34-4415-BFD4-4D7A84B0569C}" type="datetimeFigureOut">
               <a:rPr lang="en-US" smtClean="0"/>
-              <a:t>10/6/2022</a:t>
+              <a:t>10/23/2023</a:t>
             </a:fld>
             <a:endParaRPr lang="en-US"/>
           </a:p>
@@ -7590,6 +7592,89 @@
 </file>
 
 <file path=ppt/slides/slide16.xml><?xml version="1.0" encoding="utf-8"?>
+<p:sld xmlns:a="http://schemas.openxmlformats.org/drawingml/2006/main" xmlns:r="http://schemas.openxmlformats.org/officeDocument/2006/relationships" xmlns:p="http://schemas.openxmlformats.org/presentationml/2006/main">
+  <p:cSld>
+    <p:spTree>
+      <p:nvGrpSpPr>
+        <p:cNvPr id="1" name=""/>
+        <p:cNvGrpSpPr/>
+        <p:nvPr/>
+      </p:nvGrpSpPr>
+      <p:grpSpPr>
+        <a:xfrm>
+          <a:off x="0" y="0"/>
+          <a:ext cx="0" cy="0"/>
+          <a:chOff x="0" y="0"/>
+          <a:chExt cx="0" cy="0"/>
+        </a:xfrm>
+      </p:grpSpPr>
+      <p:sp>
+        <p:nvSpPr>
+          <p:cNvPr id="2" name="Title 1">
+            <a:extLst>
+              <a:ext uri="{FF2B5EF4-FFF2-40B4-BE49-F238E27FC236}">
+                <a16:creationId xmlns:a16="http://schemas.microsoft.com/office/drawing/2014/main" id="{FFEDF684-A460-5415-C1B0-363F365C9585}"/>
+              </a:ext>
+            </a:extLst>
+          </p:cNvPr>
+          <p:cNvSpPr>
+            <a:spLocks noGrp="1"/>
+          </p:cNvSpPr>
+          <p:nvPr>
+            <p:ph type="title"/>
+          </p:nvPr>
+        </p:nvSpPr>
+        <p:spPr/>
+        <p:txBody>
+          <a:bodyPr/>
+          <a:lstStyle/>
+          <a:p>
+            <a:r>
+              <a:rPr lang="en-US" dirty="0"/>
+              <a:t>Demo</a:t>
+            </a:r>
+          </a:p>
+        </p:txBody>
+      </p:sp>
+      <p:sp>
+        <p:nvSpPr>
+          <p:cNvPr id="3" name="Content Placeholder 2">
+            <a:extLst>
+              <a:ext uri="{FF2B5EF4-FFF2-40B4-BE49-F238E27FC236}">
+                <a16:creationId xmlns:a16="http://schemas.microsoft.com/office/drawing/2014/main" id="{A9021B3D-664E-CDE8-FB8C-6E2F15084108}"/>
+              </a:ext>
+            </a:extLst>
+          </p:cNvPr>
+          <p:cNvSpPr>
+            <a:spLocks noGrp="1"/>
+          </p:cNvSpPr>
+          <p:nvPr>
+            <p:ph idx="1"/>
+          </p:nvPr>
+        </p:nvSpPr>
+        <p:spPr/>
+        <p:txBody>
+          <a:bodyPr/>
+          <a:lstStyle/>
+          <a:p>
+            <a:endParaRPr lang="en-US"/>
+          </a:p>
+        </p:txBody>
+      </p:sp>
+    </p:spTree>
+    <p:extLst>
+      <p:ext uri="{BB962C8B-B14F-4D97-AF65-F5344CB8AC3E}">
+        <p14:creationId xmlns:p14="http://schemas.microsoft.com/office/powerpoint/2010/main" val="594876634"/>
+      </p:ext>
+    </p:extLst>
+  </p:cSld>
+  <p:clrMapOvr>
+    <a:masterClrMapping/>
+  </p:clrMapOvr>
+</p:sld>
+</file>
+
+<file path=ppt/slides/slide17.xml><?xml version="1.0" encoding="utf-8"?>
 <p:sld xmlns:a="http://schemas.openxmlformats.org/drawingml/2006/main" xmlns:r="http://schemas.openxmlformats.org/officeDocument/2006/relationships" xmlns:p="http://schemas.openxmlformats.org/presentationml/2006/main">
   <p:cSld>
     <p:spTree>

</xml_diff>